<commit_message>
week 5 slides, updates for weeks 2 and 4
</commit_message>
<xml_diff>
--- a/slides/week-04-conditionals-redirections.pptx
+++ b/slides/week-04-conditionals-redirections.pptx
@@ -231,7 +231,7 @@
           <a:p>
             <a:fld id="{E024E3B1-BBED-714D-AE2B-67B8E822FF8F}" type="datetimeFigureOut">
               <a:rPr lang="en-US" smtClean="0"/>
-              <a:t>9/19/18</a:t>
+              <a:t>10/2/18</a:t>
             </a:fld>
             <a:endParaRPr lang="en-US"/>
           </a:p>
@@ -3803,7 +3803,7 @@
           <a:p>
             <a:fld id="{391BA6F7-560C-8141-A5FC-F39638470071}" type="datetimeFigureOut">
               <a:rPr lang="en-US" smtClean="0"/>
-              <a:t>9/19/18</a:t>
+              <a:t>10/2/18</a:t>
             </a:fld>
             <a:endParaRPr lang="en-US"/>
           </a:p>
@@ -3973,7 +3973,7 @@
           <a:p>
             <a:fld id="{391BA6F7-560C-8141-A5FC-F39638470071}" type="datetimeFigureOut">
               <a:rPr lang="en-US" smtClean="0"/>
-              <a:t>9/19/18</a:t>
+              <a:t>10/2/18</a:t>
             </a:fld>
             <a:endParaRPr lang="en-US"/>
           </a:p>
@@ -4153,7 +4153,7 @@
           <a:p>
             <a:fld id="{391BA6F7-560C-8141-A5FC-F39638470071}" type="datetimeFigureOut">
               <a:rPr lang="en-US" smtClean="0"/>
-              <a:t>9/19/18</a:t>
+              <a:t>10/2/18</a:t>
             </a:fld>
             <a:endParaRPr lang="en-US"/>
           </a:p>
@@ -4494,7 +4494,7 @@
           <a:p>
             <a:fld id="{391BA6F7-560C-8141-A5FC-F39638470071}" type="datetimeFigureOut">
               <a:rPr lang="en-US" smtClean="0"/>
-              <a:t>9/19/18</a:t>
+              <a:t>10/2/18</a:t>
             </a:fld>
             <a:endParaRPr lang="en-US"/>
           </a:p>
@@ -4740,7 +4740,7 @@
           <a:p>
             <a:fld id="{391BA6F7-560C-8141-A5FC-F39638470071}" type="datetimeFigureOut">
               <a:rPr lang="en-US" smtClean="0"/>
-              <a:t>9/19/18</a:t>
+              <a:t>10/2/18</a:t>
             </a:fld>
             <a:endParaRPr lang="en-US"/>
           </a:p>
@@ -5028,7 +5028,7 @@
           <a:p>
             <a:fld id="{391BA6F7-560C-8141-A5FC-F39638470071}" type="datetimeFigureOut">
               <a:rPr lang="en-US" smtClean="0"/>
-              <a:t>9/19/18</a:t>
+              <a:t>10/2/18</a:t>
             </a:fld>
             <a:endParaRPr lang="en-US"/>
           </a:p>
@@ -5450,7 +5450,7 @@
           <a:p>
             <a:fld id="{391BA6F7-560C-8141-A5FC-F39638470071}" type="datetimeFigureOut">
               <a:rPr lang="en-US" smtClean="0"/>
-              <a:t>9/19/18</a:t>
+              <a:t>10/2/18</a:t>
             </a:fld>
             <a:endParaRPr lang="en-US"/>
           </a:p>
@@ -5568,7 +5568,7 @@
           <a:p>
             <a:fld id="{391BA6F7-560C-8141-A5FC-F39638470071}" type="datetimeFigureOut">
               <a:rPr lang="en-US" smtClean="0"/>
-              <a:t>9/19/18</a:t>
+              <a:t>10/2/18</a:t>
             </a:fld>
             <a:endParaRPr lang="en-US"/>
           </a:p>
@@ -5663,7 +5663,7 @@
           <a:p>
             <a:fld id="{391BA6F7-560C-8141-A5FC-F39638470071}" type="datetimeFigureOut">
               <a:rPr lang="en-US" smtClean="0"/>
-              <a:t>9/19/18</a:t>
+              <a:t>10/2/18</a:t>
             </a:fld>
             <a:endParaRPr lang="en-US"/>
           </a:p>
@@ -5940,7 +5940,7 @@
           <a:p>
             <a:fld id="{391BA6F7-560C-8141-A5FC-F39638470071}" type="datetimeFigureOut">
               <a:rPr lang="en-US" smtClean="0"/>
-              <a:t>9/19/18</a:t>
+              <a:t>10/2/18</a:t>
             </a:fld>
             <a:endParaRPr lang="en-US"/>
           </a:p>
@@ -6193,7 +6193,7 @@
           <a:p>
             <a:fld id="{391BA6F7-560C-8141-A5FC-F39638470071}" type="datetimeFigureOut">
               <a:rPr lang="en-US" smtClean="0"/>
-              <a:t>9/19/18</a:t>
+              <a:t>10/2/18</a:t>
             </a:fld>
             <a:endParaRPr lang="en-US"/>
           </a:p>
@@ -6406,7 +6406,7 @@
           <a:p>
             <a:fld id="{391BA6F7-560C-8141-A5FC-F39638470071}" type="datetimeFigureOut">
               <a:rPr lang="en-US" smtClean="0"/>
-              <a:t>9/19/18</a:t>
+              <a:t>10/2/18</a:t>
             </a:fld>
             <a:endParaRPr lang="en-US"/>
           </a:p>
@@ -6850,7 +6850,21 @@
                 <a:latin typeface="Arial"/>
                 <a:cs typeface="Arial"/>
               </a:rPr>
-              <a:t>Week 3- Conditionals, Redirections</a:t>
+              <a:t>Week </a:t>
+            </a:r>
+            <a:r>
+              <a:rPr lang="en-US" sz="2800" dirty="0" smtClean="0">
+                <a:latin typeface="Arial"/>
+                <a:cs typeface="Arial"/>
+              </a:rPr>
+              <a:t>4- </a:t>
+            </a:r>
+            <a:r>
+              <a:rPr lang="en-US" sz="2800" dirty="0" smtClean="0">
+                <a:latin typeface="Arial"/>
+                <a:cs typeface="Arial"/>
+              </a:rPr>
+              <a:t>Conditionals, Redirections</a:t>
             </a:r>
           </a:p>
         </p:txBody>
@@ -16691,7 +16705,7 @@
         </p:spPr>
         <p:txBody>
           <a:bodyPr>
-            <a:normAutofit/>
+            <a:normAutofit fontScale="92500"/>
           </a:bodyPr>
           <a:lstStyle>
             <a:lvl1pPr marL="342900" indent="-342900" algn="l" defTabSz="457200" rtl="0" eaLnBrk="1" latinLnBrk="0" hangingPunct="1">
@@ -16840,16 +16854,33 @@
             </a:r>
             <a:r>
               <a:rPr lang="en-US" sz="1600" dirty="0" smtClean="0"/>
-              <a:t> wants –A “</a:t>
-            </a:r>
-            <a:r>
-              <a:rPr lang="en-US" sz="1600" dirty="0" err="1" smtClean="0"/>
+              <a:t> wants </a:t>
+            </a:r>
+            <a:r>
+              <a:rPr lang="en-US" sz="1600" dirty="0" smtClean="0">
+                <a:latin typeface="Courier New"/>
+                <a:cs typeface="Courier New"/>
+              </a:rPr>
+              <a:t>–A “</a:t>
+            </a:r>
+            <a:r>
+              <a:rPr lang="en-US" sz="1600" dirty="0" err="1" smtClean="0">
+                <a:latin typeface="Courier New"/>
+                <a:cs typeface="Courier New"/>
+              </a:rPr>
               <a:t>mozilla</a:t>
             </a:r>
             <a:r>
-              <a:rPr lang="en-US" sz="1600" dirty="0" smtClean="0"/>
+              <a:rPr lang="en-US" sz="1600" dirty="0" smtClean="0">
+                <a:latin typeface="Courier New"/>
+                <a:cs typeface="Courier New"/>
+              </a:rPr>
               <a:t>”</a:t>
             </a:r>
+            <a:endParaRPr lang="en-US" sz="1600" dirty="0" smtClean="0">
+              <a:latin typeface="Courier New"/>
+              <a:cs typeface="Courier New"/>
+            </a:endParaRPr>
           </a:p>
         </p:txBody>
       </p:sp>

</xml_diff>